<commit_message>
Work on R paper draft
</commit_message>
<xml_diff>
--- a/predictivemodels/netcdf_figure.pptx
+++ b/predictivemodels/netcdf_figure.pptx
@@ -288,7 +288,7 @@
           <a:p>
             <a:fld id="{B3A774A5-E947-7C4A-B79D-090483C3FB0D}" type="datetimeFigureOut">
               <a:rPr lang="en-US" smtClean="0"/>
-              <a:t>12/21/16</a:t>
+              <a:t>12/29/16</a:t>
             </a:fld>
             <a:endParaRPr lang="en-US"/>
           </a:p>
@@ -458,7 +458,7 @@
           <a:p>
             <a:fld id="{B3A774A5-E947-7C4A-B79D-090483C3FB0D}" type="datetimeFigureOut">
               <a:rPr lang="en-US" smtClean="0"/>
-              <a:t>12/21/16</a:t>
+              <a:t>12/29/16</a:t>
             </a:fld>
             <a:endParaRPr lang="en-US"/>
           </a:p>
@@ -638,7 +638,7 @@
           <a:p>
             <a:fld id="{B3A774A5-E947-7C4A-B79D-090483C3FB0D}" type="datetimeFigureOut">
               <a:rPr lang="en-US" smtClean="0"/>
-              <a:t>12/21/16</a:t>
+              <a:t>12/29/16</a:t>
             </a:fld>
             <a:endParaRPr lang="en-US"/>
           </a:p>
@@ -808,7 +808,7 @@
           <a:p>
             <a:fld id="{B3A774A5-E947-7C4A-B79D-090483C3FB0D}" type="datetimeFigureOut">
               <a:rPr lang="en-US" smtClean="0"/>
-              <a:t>12/21/16</a:t>
+              <a:t>12/29/16</a:t>
             </a:fld>
             <a:endParaRPr lang="en-US"/>
           </a:p>
@@ -1054,7 +1054,7 @@
           <a:p>
             <a:fld id="{B3A774A5-E947-7C4A-B79D-090483C3FB0D}" type="datetimeFigureOut">
               <a:rPr lang="en-US" smtClean="0"/>
-              <a:t>12/21/16</a:t>
+              <a:t>12/29/16</a:t>
             </a:fld>
             <a:endParaRPr lang="en-US"/>
           </a:p>
@@ -1342,7 +1342,7 @@
           <a:p>
             <a:fld id="{B3A774A5-E947-7C4A-B79D-090483C3FB0D}" type="datetimeFigureOut">
               <a:rPr lang="en-US" smtClean="0"/>
-              <a:t>12/21/16</a:t>
+              <a:t>12/29/16</a:t>
             </a:fld>
             <a:endParaRPr lang="en-US"/>
           </a:p>
@@ -1764,7 +1764,7 @@
           <a:p>
             <a:fld id="{B3A774A5-E947-7C4A-B79D-090483C3FB0D}" type="datetimeFigureOut">
               <a:rPr lang="en-US" smtClean="0"/>
-              <a:t>12/21/16</a:t>
+              <a:t>12/29/16</a:t>
             </a:fld>
             <a:endParaRPr lang="en-US"/>
           </a:p>
@@ -1882,7 +1882,7 @@
           <a:p>
             <a:fld id="{B3A774A5-E947-7C4A-B79D-090483C3FB0D}" type="datetimeFigureOut">
               <a:rPr lang="en-US" smtClean="0"/>
-              <a:t>12/21/16</a:t>
+              <a:t>12/29/16</a:t>
             </a:fld>
             <a:endParaRPr lang="en-US"/>
           </a:p>
@@ -1977,7 +1977,7 @@
           <a:p>
             <a:fld id="{B3A774A5-E947-7C4A-B79D-090483C3FB0D}" type="datetimeFigureOut">
               <a:rPr lang="en-US" smtClean="0"/>
-              <a:t>12/21/16</a:t>
+              <a:t>12/29/16</a:t>
             </a:fld>
             <a:endParaRPr lang="en-US"/>
           </a:p>
@@ -2254,7 +2254,7 @@
           <a:p>
             <a:fld id="{B3A774A5-E947-7C4A-B79D-090483C3FB0D}" type="datetimeFigureOut">
               <a:rPr lang="en-US" smtClean="0"/>
-              <a:t>12/21/16</a:t>
+              <a:t>12/29/16</a:t>
             </a:fld>
             <a:endParaRPr lang="en-US"/>
           </a:p>
@@ -2507,7 +2507,7 @@
           <a:p>
             <a:fld id="{B3A774A5-E947-7C4A-B79D-090483C3FB0D}" type="datetimeFigureOut">
               <a:rPr lang="en-US" smtClean="0"/>
-              <a:t>12/21/16</a:t>
+              <a:t>12/29/16</a:t>
             </a:fld>
             <a:endParaRPr lang="en-US"/>
           </a:p>
@@ -2720,7 +2720,7 @@
           <a:p>
             <a:fld id="{B3A774A5-E947-7C4A-B79D-090483C3FB0D}" type="datetimeFigureOut">
               <a:rPr lang="en-US" smtClean="0"/>
-              <a:t>12/21/16</a:t>
+              <a:t>12/29/16</a:t>
             </a:fld>
             <a:endParaRPr lang="en-US"/>
           </a:p>
@@ -3103,7 +3103,7 @@
         </p:nvSpPr>
         <p:spPr>
           <a:xfrm>
-            <a:off x="3256394" y="1539880"/>
+            <a:off x="1678815" y="2089028"/>
             <a:ext cx="5008777" cy="2862167"/>
           </a:xfrm>
           <a:prstGeom prst="rect">
@@ -3148,13 +3148,13 @@
           <p:nvPr>
             <p:extLst>
               <p:ext uri="{D42A27DB-BD31-4B8C-83A1-F6EECF244321}">
-                <p14:modId xmlns:p14="http://schemas.microsoft.com/office/powerpoint/2010/main" val="2086469133"/>
+                <p14:modId xmlns:p14="http://schemas.microsoft.com/office/powerpoint/2010/main" val="1190910555"/>
               </p:ext>
             </p:extLst>
           </p:nvPr>
         </p:nvGraphicFramePr>
         <p:xfrm>
-          <a:off x="3607835" y="1873436"/>
+          <a:off x="2030256" y="2422584"/>
           <a:ext cx="4441024" cy="2263485"/>
         </p:xfrm>
         <a:graphic>
@@ -3228,11 +3228,7 @@
                       <a:pPr algn="ctr"/>
                       <a:r>
                         <a:rPr lang="en-US" baseline="0" dirty="0" smtClean="0"/>
-                        <a:t>X</a:t>
-                      </a:r>
-                      <a:r>
-                        <a:rPr lang="en-US" baseline="-25000" dirty="0" smtClean="0"/>
-                        <a:t>1</a:t>
+                        <a:t>1.25</a:t>
                       </a:r>
                       <a:endParaRPr lang="en-US" dirty="0"/>
                     </a:p>
@@ -3525,16 +3521,12 @@
                       <a:pPr algn="r"/>
                       <a:r>
                         <a:rPr lang="en-US" baseline="0" dirty="0" smtClean="0"/>
-                        <a:t>Y</a:t>
-                      </a:r>
-                      <a:r>
-                        <a:rPr lang="en-US" baseline="-25000" dirty="0" smtClean="0"/>
-                        <a:t>1</a:t>
+                        <a:t>0</a:t>
                       </a:r>
                       <a:endParaRPr lang="en-US" dirty="0"/>
                     </a:p>
                   </a:txBody>
-                  <a:tcPr>
+                  <a:tcPr anchor="ctr">
                     <a:lnL w="12700" cap="flat" cmpd="sng" algn="ctr">
                       <a:noFill/>
                       <a:prstDash val="solid"/>
@@ -3593,7 +3585,7 @@
                       <a:endParaRPr lang="en-US" dirty="0"/>
                     </a:p>
                   </a:txBody>
-                  <a:tcPr>
+                  <a:tcPr anchor="ctr">
                     <a:lnL w="12700" cap="flat" cmpd="sng" algn="ctr">
                       <a:solidFill>
                         <a:srgbClr val="000000"/>
@@ -3668,7 +3660,7 @@
                       <a:endParaRPr lang="en-US" dirty="0" smtClean="0"/>
                     </a:p>
                   </a:txBody>
-                  <a:tcPr>
+                  <a:tcPr anchor="ctr">
                     <a:lnL w="12700" cap="flat" cmpd="sng" algn="ctr">
                       <a:solidFill>
                         <a:scrgbClr r="0" g="0" b="0"/>
@@ -3743,7 +3735,7 @@
                       <a:endParaRPr lang="en-US" dirty="0" smtClean="0"/>
                     </a:p>
                   </a:txBody>
-                  <a:tcPr>
+                  <a:tcPr anchor="ctr">
                     <a:lnL w="12700" cap="flat" cmpd="sng" algn="ctr">
                       <a:solidFill>
                         <a:scrgbClr r="0" g="0" b="0"/>
@@ -3818,7 +3810,7 @@
                       <a:endParaRPr lang="en-US" dirty="0" smtClean="0"/>
                     </a:p>
                   </a:txBody>
-                  <a:tcPr>
+                  <a:tcPr anchor="ctr">
                     <a:lnL w="12700" cap="flat" cmpd="sng" algn="ctr">
                       <a:solidFill>
                         <a:scrgbClr r="0" g="0" b="0"/>
@@ -3893,7 +3885,7 @@
                       <a:endParaRPr lang="en-US" dirty="0" smtClean="0"/>
                     </a:p>
                   </a:txBody>
-                  <a:tcPr>
+                  <a:tcPr anchor="ctr">
                     <a:lnL w="12700" cap="flat" cmpd="sng" algn="ctr">
                       <a:solidFill>
                         <a:scrgbClr r="0" g="0" b="0"/>
@@ -3945,16 +3937,12 @@
                       <a:pPr algn="r"/>
                       <a:r>
                         <a:rPr lang="en-US" dirty="0" smtClean="0"/>
-                        <a:t>Y</a:t>
-                      </a:r>
-                      <a:r>
-                        <a:rPr lang="en-US" baseline="-25000" dirty="0" smtClean="0"/>
                         <a:t>2</a:t>
                       </a:r>
                       <a:endParaRPr lang="en-US" dirty="0"/>
                     </a:p>
                   </a:txBody>
-                  <a:tcPr>
+                  <a:tcPr anchor="ctr">
                     <a:lnL w="12700" cap="flat" cmpd="sng" algn="ctr">
                       <a:noFill/>
                       <a:prstDash val="solid"/>
@@ -4029,7 +4017,7 @@
                       <a:endParaRPr lang="en-US" dirty="0" smtClean="0"/>
                     </a:p>
                   </a:txBody>
-                  <a:tcPr>
+                  <a:tcPr anchor="ctr">
                     <a:lnL w="12700" cap="flat" cmpd="sng" algn="ctr">
                       <a:solidFill>
                         <a:srgbClr val="000000"/>
@@ -4104,7 +4092,7 @@
                       <a:endParaRPr lang="en-US" dirty="0" smtClean="0"/>
                     </a:p>
                   </a:txBody>
-                  <a:tcPr>
+                  <a:tcPr anchor="ctr">
                     <a:lnL w="12700" cap="flat" cmpd="sng" algn="ctr">
                       <a:solidFill>
                         <a:scrgbClr r="0" g="0" b="0"/>
@@ -4179,7 +4167,7 @@
                       <a:endParaRPr lang="en-US" dirty="0" smtClean="0"/>
                     </a:p>
                   </a:txBody>
-                  <a:tcPr>
+                  <a:tcPr anchor="ctr">
                     <a:lnL w="12700" cap="flat" cmpd="sng" algn="ctr">
                       <a:solidFill>
                         <a:scrgbClr r="0" g="0" b="0"/>
@@ -4254,7 +4242,7 @@
                       <a:endParaRPr lang="en-US" dirty="0" smtClean="0"/>
                     </a:p>
                   </a:txBody>
-                  <a:tcPr>
+                  <a:tcPr anchor="ctr">
                     <a:lnL w="12700" cap="flat" cmpd="sng" algn="ctr">
                       <a:solidFill>
                         <a:scrgbClr r="0" g="0" b="0"/>
@@ -4329,7 +4317,7 @@
                       <a:endParaRPr lang="en-US" dirty="0" smtClean="0"/>
                     </a:p>
                   </a:txBody>
-                  <a:tcPr>
+                  <a:tcPr anchor="ctr">
                     <a:lnL w="12700" cap="flat" cmpd="sng" algn="ctr">
                       <a:solidFill>
                         <a:scrgbClr r="0" g="0" b="0"/>
@@ -4381,16 +4369,12 @@
                       <a:pPr algn="r"/>
                       <a:r>
                         <a:rPr lang="en-US" dirty="0" smtClean="0"/>
-                        <a:t>Y</a:t>
-                      </a:r>
-                      <a:r>
-                        <a:rPr lang="en-US" baseline="-25000" dirty="0" smtClean="0"/>
-                        <a:t>3</a:t>
+                        <a:t>4</a:t>
                       </a:r>
                       <a:endParaRPr lang="en-US" dirty="0"/>
                     </a:p>
                   </a:txBody>
-                  <a:tcPr>
+                  <a:tcPr anchor="ctr">
                     <a:lnL w="12700" cap="flat" cmpd="sng" algn="ctr">
                       <a:noFill/>
                       <a:prstDash val="solid"/>
@@ -4465,7 +4449,7 @@
                       <a:endParaRPr lang="en-US" dirty="0" smtClean="0"/>
                     </a:p>
                   </a:txBody>
-                  <a:tcPr>
+                  <a:tcPr anchor="ctr">
                     <a:lnL w="12700" cap="flat" cmpd="sng" algn="ctr">
                       <a:solidFill>
                         <a:srgbClr val="000000"/>
@@ -4540,7 +4524,7 @@
                       <a:endParaRPr lang="en-US" dirty="0" smtClean="0"/>
                     </a:p>
                   </a:txBody>
-                  <a:tcPr>
+                  <a:tcPr anchor="ctr">
                     <a:lnL w="12700" cap="flat" cmpd="sng" algn="ctr">
                       <a:solidFill>
                         <a:scrgbClr r="0" g="0" b="0"/>
@@ -4615,7 +4599,7 @@
                       <a:endParaRPr lang="en-US" dirty="0" smtClean="0"/>
                     </a:p>
                   </a:txBody>
-                  <a:tcPr>
+                  <a:tcPr anchor="ctr">
                     <a:lnL w="12700" cap="flat" cmpd="sng" algn="ctr">
                       <a:solidFill>
                         <a:scrgbClr r="0" g="0" b="0"/>
@@ -4690,7 +4674,7 @@
                       <a:endParaRPr lang="en-US" dirty="0" smtClean="0"/>
                     </a:p>
                   </a:txBody>
-                  <a:tcPr>
+                  <a:tcPr anchor="ctr">
                     <a:lnL w="12700" cap="flat" cmpd="sng" algn="ctr">
                       <a:solidFill>
                         <a:scrgbClr r="0" g="0" b="0"/>
@@ -4765,7 +4749,7 @@
                       <a:endParaRPr lang="en-US" dirty="0" smtClean="0"/>
                     </a:p>
                   </a:txBody>
-                  <a:tcPr>
+                  <a:tcPr anchor="ctr">
                     <a:lnL w="12700" cap="flat" cmpd="sng" algn="ctr">
                       <a:solidFill>
                         <a:scrgbClr r="0" g="0" b="0"/>
@@ -4820,7 +4804,7 @@
         </p:nvSpPr>
         <p:spPr>
           <a:xfrm>
-            <a:off x="3327946" y="1665101"/>
+            <a:off x="1750367" y="2214249"/>
             <a:ext cx="5265987" cy="369332"/>
           </a:xfrm>
           <a:prstGeom prst="rect">
@@ -4851,7 +4835,7 @@
         </p:nvSpPr>
         <p:spPr>
           <a:xfrm rot="16200000">
-            <a:off x="2063643" y="2857855"/>
+            <a:off x="560772" y="3575069"/>
             <a:ext cx="2719051" cy="369332"/>
           </a:xfrm>
           <a:prstGeom prst="rect">
@@ -4882,7 +4866,7 @@
         </p:nvSpPr>
         <p:spPr>
           <a:xfrm>
-            <a:off x="3341165" y="1629320"/>
+            <a:off x="1763586" y="2178468"/>
             <a:ext cx="773876" cy="369332"/>
           </a:xfrm>
           <a:prstGeom prst="rect">
@@ -4915,7 +4899,7 @@
         </p:nvSpPr>
         <p:spPr>
           <a:xfrm>
-            <a:off x="4806789" y="906919"/>
+            <a:off x="3229210" y="1456067"/>
             <a:ext cx="5008777" cy="2862167"/>
           </a:xfrm>
           <a:prstGeom prst="rect">
@@ -4960,13 +4944,13 @@
           <p:nvPr>
             <p:extLst>
               <p:ext uri="{D42A27DB-BD31-4B8C-83A1-F6EECF244321}">
-                <p14:modId xmlns:p14="http://schemas.microsoft.com/office/powerpoint/2010/main" val="2659323765"/>
+                <p14:modId xmlns:p14="http://schemas.microsoft.com/office/powerpoint/2010/main" val="2533013589"/>
               </p:ext>
             </p:extLst>
           </p:nvPr>
         </p:nvGraphicFramePr>
         <p:xfrm>
-          <a:off x="5158230" y="1240475"/>
+          <a:off x="3580651" y="1789623"/>
           <a:ext cx="4441024" cy="2263485"/>
         </p:xfrm>
         <a:graphic>
@@ -5040,11 +5024,7 @@
                       <a:pPr algn="ctr"/>
                       <a:r>
                         <a:rPr lang="en-US" baseline="0" dirty="0" smtClean="0"/>
-                        <a:t>X</a:t>
-                      </a:r>
-                      <a:r>
-                        <a:rPr lang="en-US" baseline="-25000" dirty="0" smtClean="0"/>
-                        <a:t>1</a:t>
+                        <a:t>1.25</a:t>
                       </a:r>
                       <a:endParaRPr lang="en-US" dirty="0"/>
                     </a:p>
@@ -5337,16 +5317,12 @@
                       <a:pPr algn="r"/>
                       <a:r>
                         <a:rPr lang="en-US" baseline="0" dirty="0" smtClean="0"/>
-                        <a:t>Y</a:t>
-                      </a:r>
-                      <a:r>
-                        <a:rPr lang="en-US" baseline="-25000" dirty="0" smtClean="0"/>
-                        <a:t>1</a:t>
+                        <a:t>0</a:t>
                       </a:r>
                       <a:endParaRPr lang="en-US" dirty="0"/>
                     </a:p>
                   </a:txBody>
-                  <a:tcPr>
+                  <a:tcPr anchor="ctr">
                     <a:lnL w="12700" cap="flat" cmpd="sng" algn="ctr">
                       <a:noFill/>
                       <a:prstDash val="solid"/>
@@ -5405,7 +5381,7 @@
                       <a:endParaRPr lang="en-US" dirty="0"/>
                     </a:p>
                   </a:txBody>
-                  <a:tcPr>
+                  <a:tcPr anchor="ctr">
                     <a:lnL w="12700" cap="flat" cmpd="sng" algn="ctr">
                       <a:solidFill>
                         <a:srgbClr val="000000"/>
@@ -5480,7 +5456,7 @@
                       <a:endParaRPr lang="en-US" dirty="0" smtClean="0"/>
                     </a:p>
                   </a:txBody>
-                  <a:tcPr>
+                  <a:tcPr anchor="ctr">
                     <a:lnL w="12700" cap="flat" cmpd="sng" algn="ctr">
                       <a:solidFill>
                         <a:scrgbClr r="0" g="0" b="0"/>
@@ -5555,7 +5531,7 @@
                       <a:endParaRPr lang="en-US" dirty="0" smtClean="0"/>
                     </a:p>
                   </a:txBody>
-                  <a:tcPr>
+                  <a:tcPr anchor="ctr">
                     <a:lnL w="12700" cap="flat" cmpd="sng" algn="ctr">
                       <a:solidFill>
                         <a:scrgbClr r="0" g="0" b="0"/>
@@ -5630,7 +5606,7 @@
                       <a:endParaRPr lang="en-US" dirty="0" smtClean="0"/>
                     </a:p>
                   </a:txBody>
-                  <a:tcPr>
+                  <a:tcPr anchor="ctr">
                     <a:lnL w="12700" cap="flat" cmpd="sng" algn="ctr">
                       <a:solidFill>
                         <a:scrgbClr r="0" g="0" b="0"/>
@@ -5705,7 +5681,7 @@
                       <a:endParaRPr lang="en-US" dirty="0" smtClean="0"/>
                     </a:p>
                   </a:txBody>
-                  <a:tcPr>
+                  <a:tcPr anchor="ctr">
                     <a:lnL w="12700" cap="flat" cmpd="sng" algn="ctr">
                       <a:solidFill>
                         <a:scrgbClr r="0" g="0" b="0"/>
@@ -5757,16 +5733,12 @@
                       <a:pPr algn="r"/>
                       <a:r>
                         <a:rPr lang="en-US" dirty="0" smtClean="0"/>
-                        <a:t>Y</a:t>
-                      </a:r>
-                      <a:r>
-                        <a:rPr lang="en-US" baseline="-25000" dirty="0" smtClean="0"/>
                         <a:t>2</a:t>
                       </a:r>
                       <a:endParaRPr lang="en-US" dirty="0"/>
                     </a:p>
                   </a:txBody>
-                  <a:tcPr>
+                  <a:tcPr anchor="ctr">
                     <a:lnL w="12700" cap="flat" cmpd="sng" algn="ctr">
                       <a:noFill/>
                       <a:prstDash val="solid"/>
@@ -5841,7 +5813,7 @@
                       <a:endParaRPr lang="en-US" dirty="0" smtClean="0"/>
                     </a:p>
                   </a:txBody>
-                  <a:tcPr>
+                  <a:tcPr anchor="ctr">
                     <a:lnL w="12700" cap="flat" cmpd="sng" algn="ctr">
                       <a:solidFill>
                         <a:srgbClr val="000000"/>
@@ -5916,7 +5888,7 @@
                       <a:endParaRPr lang="en-US" dirty="0" smtClean="0"/>
                     </a:p>
                   </a:txBody>
-                  <a:tcPr>
+                  <a:tcPr anchor="ctr">
                     <a:lnL w="12700" cap="flat" cmpd="sng" algn="ctr">
                       <a:solidFill>
                         <a:scrgbClr r="0" g="0" b="0"/>
@@ -5991,7 +5963,7 @@
                       <a:endParaRPr lang="en-US" dirty="0" smtClean="0"/>
                     </a:p>
                   </a:txBody>
-                  <a:tcPr>
+                  <a:tcPr anchor="ctr">
                     <a:lnL w="12700" cap="flat" cmpd="sng" algn="ctr">
                       <a:solidFill>
                         <a:scrgbClr r="0" g="0" b="0"/>
@@ -6066,7 +6038,7 @@
                       <a:endParaRPr lang="en-US" dirty="0" smtClean="0"/>
                     </a:p>
                   </a:txBody>
-                  <a:tcPr>
+                  <a:tcPr anchor="ctr">
                     <a:lnL w="12700" cap="flat" cmpd="sng" algn="ctr">
                       <a:solidFill>
                         <a:scrgbClr r="0" g="0" b="0"/>
@@ -6141,7 +6113,7 @@
                       <a:endParaRPr lang="en-US" dirty="0" smtClean="0"/>
                     </a:p>
                   </a:txBody>
-                  <a:tcPr>
+                  <a:tcPr anchor="ctr">
                     <a:lnL w="12700" cap="flat" cmpd="sng" algn="ctr">
                       <a:solidFill>
                         <a:scrgbClr r="0" g="0" b="0"/>
@@ -6193,16 +6165,12 @@
                       <a:pPr algn="r"/>
                       <a:r>
                         <a:rPr lang="en-US" dirty="0" smtClean="0"/>
-                        <a:t>Y</a:t>
-                      </a:r>
-                      <a:r>
-                        <a:rPr lang="en-US" baseline="-25000" dirty="0" smtClean="0"/>
-                        <a:t>3</a:t>
+                        <a:t>4</a:t>
                       </a:r>
                       <a:endParaRPr lang="en-US" dirty="0"/>
                     </a:p>
                   </a:txBody>
-                  <a:tcPr>
+                  <a:tcPr anchor="ctr">
                     <a:lnL w="12700" cap="flat" cmpd="sng" algn="ctr">
                       <a:noFill/>
                       <a:prstDash val="solid"/>
@@ -6277,7 +6245,7 @@
                       <a:endParaRPr lang="en-US" dirty="0" smtClean="0"/>
                     </a:p>
                   </a:txBody>
-                  <a:tcPr>
+                  <a:tcPr anchor="ctr">
                     <a:lnL w="12700" cap="flat" cmpd="sng" algn="ctr">
                       <a:solidFill>
                         <a:srgbClr val="000000"/>
@@ -6352,7 +6320,7 @@
                       <a:endParaRPr lang="en-US" dirty="0" smtClean="0"/>
                     </a:p>
                   </a:txBody>
-                  <a:tcPr>
+                  <a:tcPr anchor="ctr">
                     <a:lnL w="12700" cap="flat" cmpd="sng" algn="ctr">
                       <a:solidFill>
                         <a:scrgbClr r="0" g="0" b="0"/>
@@ -6427,7 +6395,7 @@
                       <a:endParaRPr lang="en-US" dirty="0" smtClean="0"/>
                     </a:p>
                   </a:txBody>
-                  <a:tcPr>
+                  <a:tcPr anchor="ctr">
                     <a:lnL w="12700" cap="flat" cmpd="sng" algn="ctr">
                       <a:solidFill>
                         <a:scrgbClr r="0" g="0" b="0"/>
@@ -6502,7 +6470,7 @@
                       <a:endParaRPr lang="en-US" dirty="0" smtClean="0"/>
                     </a:p>
                   </a:txBody>
-                  <a:tcPr>
+                  <a:tcPr anchor="ctr">
                     <a:lnL w="12700" cap="flat" cmpd="sng" algn="ctr">
                       <a:solidFill>
                         <a:scrgbClr r="0" g="0" b="0"/>
@@ -6577,7 +6545,7 @@
                       <a:endParaRPr lang="en-US" dirty="0" smtClean="0"/>
                     </a:p>
                   </a:txBody>
-                  <a:tcPr>
+                  <a:tcPr anchor="ctr">
                     <a:lnL w="12700" cap="flat" cmpd="sng" algn="ctr">
                       <a:solidFill>
                         <a:scrgbClr r="0" g="0" b="0"/>
@@ -6632,7 +6600,7 @@
         </p:nvSpPr>
         <p:spPr>
           <a:xfrm>
-            <a:off x="4878341" y="1032140"/>
+            <a:off x="3300762" y="1581288"/>
             <a:ext cx="5265987" cy="369332"/>
           </a:xfrm>
           <a:prstGeom prst="rect">
@@ -6663,7 +6631,7 @@
         </p:nvSpPr>
         <p:spPr>
           <a:xfrm rot="16200000">
-            <a:off x="3614038" y="2224894"/>
+            <a:off x="2129844" y="2998130"/>
             <a:ext cx="2719051" cy="369332"/>
           </a:xfrm>
           <a:prstGeom prst="rect">
@@ -6694,7 +6662,7 @@
         </p:nvSpPr>
         <p:spPr>
           <a:xfrm>
-            <a:off x="4891560" y="996359"/>
+            <a:off x="3313981" y="1545507"/>
             <a:ext cx="773876" cy="369332"/>
           </a:xfrm>
           <a:prstGeom prst="rect">
@@ -6727,7 +6695,7 @@
         </p:nvSpPr>
         <p:spPr>
           <a:xfrm>
-            <a:off x="6384368" y="321990"/>
+            <a:off x="4806789" y="871138"/>
             <a:ext cx="5008777" cy="2862167"/>
           </a:xfrm>
           <a:prstGeom prst="rect">
@@ -6772,13 +6740,13 @@
           <p:nvPr>
             <p:extLst>
               <p:ext uri="{D42A27DB-BD31-4B8C-83A1-F6EECF244321}">
-                <p14:modId xmlns:p14="http://schemas.microsoft.com/office/powerpoint/2010/main" val="3606174237"/>
+                <p14:modId xmlns:p14="http://schemas.microsoft.com/office/powerpoint/2010/main" val="873341347"/>
               </p:ext>
             </p:extLst>
           </p:nvPr>
         </p:nvGraphicFramePr>
         <p:xfrm>
-          <a:off x="6735809" y="655546"/>
+          <a:off x="5158230" y="1204694"/>
           <a:ext cx="4441024" cy="2263485"/>
         </p:xfrm>
         <a:graphic>
@@ -6852,11 +6820,7 @@
                       <a:pPr algn="ctr"/>
                       <a:r>
                         <a:rPr lang="en-US" baseline="0" dirty="0" smtClean="0"/>
-                        <a:t>X</a:t>
-                      </a:r>
-                      <a:r>
-                        <a:rPr lang="en-US" baseline="-25000" dirty="0" smtClean="0"/>
-                        <a:t>1</a:t>
+                        <a:t>1.25</a:t>
                       </a:r>
                       <a:endParaRPr lang="en-US" dirty="0"/>
                     </a:p>
@@ -6911,11 +6875,7 @@
                       <a:pPr algn="ctr"/>
                       <a:r>
                         <a:rPr lang="en-US" dirty="0" smtClean="0"/>
-                        <a:t>X</a:t>
-                      </a:r>
-                      <a:r>
-                        <a:rPr lang="en-US" baseline="-25000" dirty="0" smtClean="0"/>
-                        <a:t>2</a:t>
+                        <a:t>3.75</a:t>
                       </a:r>
                       <a:endParaRPr lang="en-US" dirty="0"/>
                     </a:p>
@@ -6970,11 +6930,7 @@
                       <a:pPr algn="ctr"/>
                       <a:r>
                         <a:rPr lang="en-US" dirty="0" smtClean="0"/>
-                        <a:t>X</a:t>
-                      </a:r>
-                      <a:r>
-                        <a:rPr lang="en-US" baseline="-25000" dirty="0" smtClean="0"/>
-                        <a:t>3</a:t>
+                        <a:t>6.25</a:t>
                       </a:r>
                       <a:endParaRPr lang="en-US" dirty="0"/>
                     </a:p>
@@ -7029,11 +6985,7 @@
                       <a:pPr algn="ctr"/>
                       <a:r>
                         <a:rPr lang="en-US" dirty="0" smtClean="0"/>
-                        <a:t>X</a:t>
-                      </a:r>
-                      <a:r>
-                        <a:rPr lang="en-US" baseline="-25000" dirty="0" smtClean="0"/>
-                        <a:t>4</a:t>
+                        <a:t>8.75</a:t>
                       </a:r>
                       <a:endParaRPr lang="en-US" dirty="0"/>
                     </a:p>
@@ -7088,11 +7040,7 @@
                       <a:pPr algn="ctr"/>
                       <a:r>
                         <a:rPr lang="en-US" dirty="0" smtClean="0"/>
-                        <a:t>X</a:t>
-                      </a:r>
-                      <a:r>
-                        <a:rPr lang="en-US" baseline="-25000" dirty="0" smtClean="0"/>
-                        <a:t>5</a:t>
+                        <a:t>11.25</a:t>
                       </a:r>
                       <a:endParaRPr lang="en-US" dirty="0"/>
                     </a:p>
@@ -7149,16 +7097,12 @@
                       <a:pPr algn="r"/>
                       <a:r>
                         <a:rPr lang="en-US" baseline="0" dirty="0" smtClean="0"/>
-                        <a:t>Y</a:t>
-                      </a:r>
-                      <a:r>
-                        <a:rPr lang="en-US" baseline="-25000" dirty="0" smtClean="0"/>
-                        <a:t>1</a:t>
+                        <a:t>0</a:t>
                       </a:r>
                       <a:endParaRPr lang="en-US" dirty="0"/>
                     </a:p>
                   </a:txBody>
-                  <a:tcPr>
+                  <a:tcPr anchor="ctr">
                     <a:lnL w="12700" cap="flat" cmpd="sng" algn="ctr">
                       <a:noFill/>
                       <a:prstDash val="solid"/>
@@ -7217,7 +7161,7 @@
                       <a:endParaRPr lang="en-US" dirty="0"/>
                     </a:p>
                   </a:txBody>
-                  <a:tcPr>
+                  <a:tcPr anchor="ctr">
                     <a:lnL w="12700" cap="flat" cmpd="sng" algn="ctr">
                       <a:solidFill>
                         <a:srgbClr val="000000"/>
@@ -7292,7 +7236,7 @@
                       <a:endParaRPr lang="en-US" dirty="0" smtClean="0"/>
                     </a:p>
                   </a:txBody>
-                  <a:tcPr>
+                  <a:tcPr anchor="ctr">
                     <a:lnL w="12700" cap="flat" cmpd="sng" algn="ctr">
                       <a:solidFill>
                         <a:scrgbClr r="0" g="0" b="0"/>
@@ -7367,7 +7311,7 @@
                       <a:endParaRPr lang="en-US" dirty="0" smtClean="0"/>
                     </a:p>
                   </a:txBody>
-                  <a:tcPr>
+                  <a:tcPr anchor="ctr">
                     <a:lnL w="12700" cap="flat" cmpd="sng" algn="ctr">
                       <a:solidFill>
                         <a:scrgbClr r="0" g="0" b="0"/>
@@ -7442,7 +7386,7 @@
                       <a:endParaRPr lang="en-US" dirty="0" smtClean="0"/>
                     </a:p>
                   </a:txBody>
-                  <a:tcPr>
+                  <a:tcPr anchor="ctr">
                     <a:lnL w="12700" cap="flat" cmpd="sng" algn="ctr">
                       <a:solidFill>
                         <a:scrgbClr r="0" g="0" b="0"/>
@@ -7517,7 +7461,7 @@
                       <a:endParaRPr lang="en-US" dirty="0" smtClean="0"/>
                     </a:p>
                   </a:txBody>
-                  <a:tcPr>
+                  <a:tcPr anchor="ctr">
                     <a:lnL w="12700" cap="flat" cmpd="sng" algn="ctr">
                       <a:solidFill>
                         <a:scrgbClr r="0" g="0" b="0"/>
@@ -7568,17 +7512,13 @@
                     <a:p>
                       <a:pPr algn="r"/>
                       <a:r>
-                        <a:rPr lang="en-US" dirty="0" smtClean="0"/>
-                        <a:t>Y</a:t>
-                      </a:r>
-                      <a:r>
-                        <a:rPr lang="en-US" baseline="-25000" dirty="0" smtClean="0"/>
+                        <a:rPr lang="en-US" baseline="0" dirty="0" smtClean="0"/>
                         <a:t>2</a:t>
                       </a:r>
-                      <a:endParaRPr lang="en-US" dirty="0"/>
+                      <a:endParaRPr lang="en-US" baseline="0" dirty="0"/>
                     </a:p>
                   </a:txBody>
-                  <a:tcPr>
+                  <a:tcPr anchor="ctr">
                     <a:lnL w="12700" cap="flat" cmpd="sng" algn="ctr">
                       <a:noFill/>
                       <a:prstDash val="solid"/>
@@ -7653,7 +7593,7 @@
                       <a:endParaRPr lang="en-US" dirty="0" smtClean="0"/>
                     </a:p>
                   </a:txBody>
-                  <a:tcPr>
+                  <a:tcPr anchor="ctr">
                     <a:lnL w="12700" cap="flat" cmpd="sng" algn="ctr">
                       <a:solidFill>
                         <a:srgbClr val="000000"/>
@@ -7728,7 +7668,7 @@
                       <a:endParaRPr lang="en-US" dirty="0" smtClean="0"/>
                     </a:p>
                   </a:txBody>
-                  <a:tcPr>
+                  <a:tcPr anchor="ctr">
                     <a:lnL w="12700" cap="flat" cmpd="sng" algn="ctr">
                       <a:solidFill>
                         <a:scrgbClr r="0" g="0" b="0"/>
@@ -7803,7 +7743,7 @@
                       <a:endParaRPr lang="en-US" dirty="0" smtClean="0"/>
                     </a:p>
                   </a:txBody>
-                  <a:tcPr>
+                  <a:tcPr anchor="ctr">
                     <a:lnL w="12700" cap="flat" cmpd="sng" algn="ctr">
                       <a:solidFill>
                         <a:scrgbClr r="0" g="0" b="0"/>
@@ -7878,7 +7818,7 @@
                       <a:endParaRPr lang="en-US" dirty="0" smtClean="0"/>
                     </a:p>
                   </a:txBody>
-                  <a:tcPr>
+                  <a:tcPr anchor="ctr">
                     <a:lnL w="12700" cap="flat" cmpd="sng" algn="ctr">
                       <a:solidFill>
                         <a:scrgbClr r="0" g="0" b="0"/>
@@ -7953,7 +7893,7 @@
                       <a:endParaRPr lang="en-US" dirty="0" smtClean="0"/>
                     </a:p>
                   </a:txBody>
-                  <a:tcPr>
+                  <a:tcPr anchor="ctr">
                     <a:lnL w="12700" cap="flat" cmpd="sng" algn="ctr">
                       <a:solidFill>
                         <a:scrgbClr r="0" g="0" b="0"/>
@@ -8005,16 +7945,12 @@
                       <a:pPr algn="r"/>
                       <a:r>
                         <a:rPr lang="en-US" dirty="0" smtClean="0"/>
-                        <a:t>Y</a:t>
-                      </a:r>
-                      <a:r>
-                        <a:rPr lang="en-US" baseline="-25000" dirty="0" smtClean="0"/>
-                        <a:t>3</a:t>
+                        <a:t>4</a:t>
                       </a:r>
                       <a:endParaRPr lang="en-US" dirty="0"/>
                     </a:p>
                   </a:txBody>
-                  <a:tcPr>
+                  <a:tcPr anchor="ctr">
                     <a:lnL w="12700" cap="flat" cmpd="sng" algn="ctr">
                       <a:noFill/>
                       <a:prstDash val="solid"/>
@@ -8089,7 +8025,7 @@
                       <a:endParaRPr lang="en-US" dirty="0" smtClean="0"/>
                     </a:p>
                   </a:txBody>
-                  <a:tcPr>
+                  <a:tcPr anchor="ctr">
                     <a:lnL w="12700" cap="flat" cmpd="sng" algn="ctr">
                       <a:solidFill>
                         <a:srgbClr val="000000"/>
@@ -8164,7 +8100,7 @@
                       <a:endParaRPr lang="en-US" dirty="0" smtClean="0"/>
                     </a:p>
                   </a:txBody>
-                  <a:tcPr>
+                  <a:tcPr anchor="ctr">
                     <a:lnL w="12700" cap="flat" cmpd="sng" algn="ctr">
                       <a:solidFill>
                         <a:scrgbClr r="0" g="0" b="0"/>
@@ -8239,7 +8175,7 @@
                       <a:endParaRPr lang="en-US" dirty="0" smtClean="0"/>
                     </a:p>
                   </a:txBody>
-                  <a:tcPr>
+                  <a:tcPr anchor="ctr">
                     <a:lnL w="12700" cap="flat" cmpd="sng" algn="ctr">
                       <a:solidFill>
                         <a:scrgbClr r="0" g="0" b="0"/>
@@ -8314,7 +8250,7 @@
                       <a:endParaRPr lang="en-US" dirty="0" smtClean="0"/>
                     </a:p>
                   </a:txBody>
-                  <a:tcPr>
+                  <a:tcPr anchor="ctr">
                     <a:lnL w="12700" cap="flat" cmpd="sng" algn="ctr">
                       <a:solidFill>
                         <a:scrgbClr r="0" g="0" b="0"/>
@@ -8389,7 +8325,7 @@
                       <a:endParaRPr lang="en-US" dirty="0" smtClean="0"/>
                     </a:p>
                   </a:txBody>
-                  <a:tcPr>
+                  <a:tcPr anchor="ctr">
                     <a:lnL w="12700" cap="flat" cmpd="sng" algn="ctr">
                       <a:solidFill>
                         <a:scrgbClr r="0" g="0" b="0"/>
@@ -8444,7 +8380,7 @@
         </p:nvSpPr>
         <p:spPr>
           <a:xfrm>
-            <a:off x="6455920" y="447211"/>
+            <a:off x="4878341" y="996359"/>
             <a:ext cx="5265987" cy="369332"/>
           </a:xfrm>
           <a:prstGeom prst="rect">
@@ -8475,7 +8411,7 @@
         </p:nvSpPr>
         <p:spPr>
           <a:xfrm rot="16200000">
-            <a:off x="5191617" y="1639965"/>
+            <a:off x="3707423" y="2413201"/>
             <a:ext cx="2719051" cy="369332"/>
           </a:xfrm>
           <a:prstGeom prst="rect">
@@ -8506,7 +8442,7 @@
         </p:nvSpPr>
         <p:spPr>
           <a:xfrm>
-            <a:off x="6469139" y="411430"/>
+            <a:off x="4891560" y="960578"/>
             <a:ext cx="773876" cy="369332"/>
           </a:xfrm>
           <a:prstGeom prst="rect">
@@ -8539,7 +8475,7 @@
         </p:nvCxnSpPr>
         <p:spPr>
           <a:xfrm flipH="1">
-            <a:off x="1896179" y="3096180"/>
+            <a:off x="318600" y="3645328"/>
             <a:ext cx="1235000" cy="425668"/>
           </a:xfrm>
           <a:prstGeom prst="straightConnector1">
@@ -8573,7 +8509,7 @@
         </p:nvSpPr>
         <p:spPr>
           <a:xfrm>
-            <a:off x="9438262" y="2289728"/>
+            <a:off x="7860683" y="2838876"/>
             <a:ext cx="1008621" cy="590316"/>
           </a:xfrm>
           <a:prstGeom prst="ellipse">
@@ -8617,7 +8553,7 @@
         </p:nvCxnSpPr>
         <p:spPr>
           <a:xfrm>
-            <a:off x="10144328" y="2880044"/>
+            <a:off x="8566749" y="3429192"/>
             <a:ext cx="302555" cy="641804"/>
           </a:xfrm>
           <a:prstGeom prst="line">
@@ -8652,8 +8588,8 @@
         </p:nvSpPr>
         <p:spPr>
           <a:xfrm>
-            <a:off x="9744014" y="3433348"/>
-            <a:ext cx="1577579" cy="1200329"/>
+            <a:off x="8203789" y="3982496"/>
+            <a:ext cx="1686485" cy="1200329"/>
           </a:xfrm>
           <a:prstGeom prst="rect">
             <a:avLst/>
@@ -8669,28 +8605,256 @@
             <a:pPr algn="ctr"/>
             <a:r>
               <a:rPr lang="en-US" dirty="0" smtClean="0"/>
-              <a:t>Temperature on Day 1 at longitude X</a:t>
+              <a:t>Temperature </a:t>
+            </a:r>
+            <a:r>
+              <a:rPr lang="en-US" dirty="0" smtClean="0"/>
+              <a:t>at </a:t>
+            </a:r>
+            <a:r>
+              <a:rPr lang="en-US" dirty="0" smtClean="0"/>
+              <a:t>longitude </a:t>
+            </a:r>
+            <a:r>
+              <a:rPr lang="en-US" dirty="0" smtClean="0"/>
+              <a:t>8.75</a:t>
+            </a:r>
+            <a:r>
+              <a:rPr lang="en-US" baseline="30000" dirty="0" smtClean="0"/>
+              <a:t>o</a:t>
+            </a:r>
+            <a:r>
+              <a:rPr lang="en-US" dirty="0" smtClean="0"/>
+              <a:t> </a:t>
+            </a:r>
+            <a:r>
+              <a:rPr lang="en-US" dirty="0" smtClean="0"/>
+              <a:t>and latitude </a:t>
+            </a:r>
+            <a:r>
+              <a:rPr lang="en-US" dirty="0" smtClean="0"/>
+              <a:t>4</a:t>
+            </a:r>
+            <a:r>
+              <a:rPr lang="en-US" baseline="30000" dirty="0" smtClean="0"/>
+              <a:t>o</a:t>
             </a:r>
             <a:r>
               <a:rPr lang="en-US" baseline="-25000" dirty="0" smtClean="0"/>
-              <a:t>4</a:t>
-            </a:r>
+              <a:t> </a:t>
+            </a:r>
+            <a:r>
+              <a:rPr lang="en-US" dirty="0" smtClean="0"/>
+              <a:t>on day 1</a:t>
+            </a:r>
+            <a:endParaRPr lang="en-US" dirty="0"/>
+          </a:p>
+        </p:txBody>
+      </p:sp>
+      <p:sp>
+        <p:nvSpPr>
+          <p:cNvPr id="2" name="Rectangle 1"/>
+          <p:cNvSpPr/>
+          <p:nvPr/>
+        </p:nvSpPr>
+        <p:spPr>
+          <a:xfrm>
+            <a:off x="10037000" y="871138"/>
+            <a:ext cx="3130360" cy="3447096"/>
+          </a:xfrm>
+          <a:prstGeom prst="rect">
+            <a:avLst/>
+          </a:prstGeom>
+        </p:spPr>
+        <p:style>
+          <a:lnRef idx="1">
+            <a:schemeClr val="dk1"/>
+          </a:lnRef>
+          <a:fillRef idx="2">
+            <a:schemeClr val="dk1"/>
+          </a:fillRef>
+          <a:effectRef idx="1">
+            <a:schemeClr val="dk1"/>
+          </a:effectRef>
+          <a:fontRef idx="minor">
+            <a:schemeClr val="dk1"/>
+          </a:fontRef>
+        </p:style>
+        <p:txBody>
+          <a:bodyPr rtlCol="0" anchor="ctr"/>
+          <a:lstStyle/>
+          <a:p>
+            <a:pPr algn="ctr"/>
+            <a:endParaRPr lang="en-US"/>
+          </a:p>
+        </p:txBody>
+      </p:sp>
+      <p:sp>
+        <p:nvSpPr>
+          <p:cNvPr id="22" name="TextBox 21"/>
+          <p:cNvSpPr txBox="1"/>
+          <p:nvPr/>
+        </p:nvSpPr>
+        <p:spPr>
+          <a:xfrm>
+            <a:off x="10101689" y="910811"/>
+            <a:ext cx="3065671" cy="2585323"/>
+          </a:xfrm>
+          <a:prstGeom prst="rect">
+            <a:avLst/>
+          </a:prstGeom>
+          <a:noFill/>
+        </p:spPr>
+        <p:txBody>
+          <a:bodyPr wrap="square" rtlCol="0">
+            <a:spAutoFit/>
+          </a:bodyPr>
+          <a:lstStyle/>
+          <a:p>
+            <a:r>
+              <a:rPr lang="en-US" dirty="0" smtClean="0"/>
+              <a:t>Attributes</a:t>
+            </a:r>
+          </a:p>
+          <a:p>
+            <a:endParaRPr lang="en-US" dirty="0"/>
+          </a:p>
+          <a:p>
+            <a:r>
+              <a:rPr lang="en-US" dirty="0" smtClean="0"/>
+              <a:t>- time    Size: 1825</a:t>
+            </a:r>
+          </a:p>
+          <a:p>
+            <a:r>
+              <a:rPr lang="en-US" dirty="0" smtClean="0"/>
+              <a:t>    </a:t>
+            </a:r>
+            <a:r>
+              <a:rPr lang="en-US" dirty="0" smtClean="0"/>
+              <a:t>Units</a:t>
+            </a:r>
+            <a:r>
+              <a:rPr lang="en-US" dirty="0"/>
+              <a:t>: days since 2006-01-</a:t>
+            </a:r>
+            <a:r>
+              <a:rPr lang="en-US" dirty="0" smtClean="0"/>
+              <a:t>01</a:t>
+            </a:r>
+          </a:p>
+          <a:p>
             <a:r>
               <a:rPr lang="en-US" dirty="0"/>
               <a:t> </a:t>
             </a:r>
             <a:r>
               <a:rPr lang="en-US" dirty="0" smtClean="0"/>
-              <a:t>and latitude Y</a:t>
-            </a:r>
-            <a:r>
-              <a:rPr lang="en-US" baseline="-25000" dirty="0" smtClean="0"/>
-              <a:t>3</a:t>
+              <a:t>   Calendar: </a:t>
+            </a:r>
+            <a:r>
+              <a:rPr lang="en-US" dirty="0" err="1" smtClean="0"/>
+              <a:t>noleap</a:t>
+            </a:r>
+            <a:endParaRPr lang="en-US" dirty="0" smtClean="0"/>
+          </a:p>
+          <a:p>
+            <a:r>
+              <a:rPr lang="en-US" dirty="0" smtClean="0"/>
+              <a:t>- </a:t>
+            </a:r>
+            <a:r>
+              <a:rPr lang="en-US" dirty="0" err="1" smtClean="0"/>
+              <a:t>lat</a:t>
+            </a:r>
+            <a:r>
+              <a:rPr lang="en-US" dirty="0" smtClean="0"/>
+              <a:t>    Size: 3</a:t>
+            </a:r>
+          </a:p>
+          <a:p>
+            <a:r>
+              <a:rPr lang="en-US" dirty="0" smtClean="0"/>
+              <a:t>    Units: </a:t>
+            </a:r>
+            <a:r>
+              <a:rPr lang="en-US" dirty="0" err="1" smtClean="0"/>
+              <a:t>degrees_east</a:t>
+            </a:r>
+            <a:endParaRPr lang="en-US" dirty="0" smtClean="0"/>
+          </a:p>
+          <a:p>
+            <a:r>
+              <a:rPr lang="en-US" dirty="0"/>
+              <a:t>- </a:t>
+            </a:r>
+            <a:r>
+              <a:rPr lang="en-US" dirty="0" err="1"/>
+              <a:t>lon</a:t>
+            </a:r>
+            <a:r>
+              <a:rPr lang="en-US" dirty="0"/>
+              <a:t>    Size: 5</a:t>
+            </a:r>
+          </a:p>
+          <a:p>
+            <a:r>
+              <a:rPr lang="en-US" dirty="0"/>
+              <a:t>    </a:t>
+            </a:r>
+            <a:r>
+              <a:rPr lang="en-US" dirty="0" smtClean="0"/>
+              <a:t>Units</a:t>
+            </a:r>
+            <a:r>
+              <a:rPr lang="en-US" dirty="0"/>
+              <a:t>: </a:t>
+            </a:r>
+            <a:r>
+              <a:rPr lang="en-US" dirty="0" err="1" smtClean="0"/>
+              <a:t>degrees_north</a:t>
             </a:r>
             <a:endParaRPr lang="en-US" dirty="0"/>
           </a:p>
         </p:txBody>
       </p:sp>
+      <p:cxnSp>
+        <p:nvCxnSpPr>
+          <p:cNvPr id="19" name="Straight Connector 18"/>
+          <p:cNvCxnSpPr/>
+          <p:nvPr/>
+        </p:nvCxnSpPr>
+        <p:spPr>
+          <a:xfrm>
+            <a:off x="11598483" y="3533482"/>
+            <a:ext cx="0" cy="646674"/>
+          </a:xfrm>
+          <a:prstGeom prst="line">
+            <a:avLst/>
+          </a:prstGeom>
+          <a:ln>
+            <a:solidFill>
+              <a:schemeClr val="tx1"/>
+            </a:solidFill>
+            <a:prstDash val="sysDash"/>
+            <a:tailEnd type="triangle" w="lg" len="med"/>
+          </a:ln>
+        </p:spPr>
+        <p:style>
+          <a:lnRef idx="2">
+            <a:schemeClr val="accent1"/>
+          </a:lnRef>
+          <a:fillRef idx="0">
+            <a:schemeClr val="accent1"/>
+          </a:fillRef>
+          <a:effectRef idx="1">
+            <a:schemeClr val="accent1"/>
+          </a:effectRef>
+          <a:fontRef idx="minor">
+            <a:schemeClr val="tx1"/>
+          </a:fontRef>
+        </p:style>
+      </p:cxnSp>
     </p:spTree>
     <p:extLst>
       <p:ext uri="{BB962C8B-B14F-4D97-AF65-F5344CB8AC3E}">

</xml_diff>